<commit_message>
Add instructions for retreiving github materials to ppt
</commit_message>
<xml_diff>
--- a/Leveraging Data in Clinical Research_R Workshop & Clinical Trial Visualizations_.pptx
+++ b/Leveraging Data in Clinical Research_R Workshop & Clinical Trial Visualizations_.pptx
@@ -5,7 +5,7 @@
     <p:sldMasterId id="2147483745" r:id="rId1"/>
   </p:sldMasterIdLst>
   <p:notesMasterIdLst>
-    <p:notesMasterId r:id="rId27"/>
+    <p:notesMasterId r:id="rId28"/>
   </p:notesMasterIdLst>
   <p:sldIdLst>
     <p:sldId id="256" r:id="rId2"/>
@@ -17,22 +17,23 @@
     <p:sldId id="261" r:id="rId8"/>
     <p:sldId id="265" r:id="rId9"/>
     <p:sldId id="266" r:id="rId10"/>
-    <p:sldId id="293" r:id="rId11"/>
-    <p:sldId id="267" r:id="rId12"/>
-    <p:sldId id="281" r:id="rId13"/>
-    <p:sldId id="284" r:id="rId14"/>
-    <p:sldId id="285" r:id="rId15"/>
-    <p:sldId id="286" r:id="rId16"/>
-    <p:sldId id="294" r:id="rId17"/>
-    <p:sldId id="295" r:id="rId18"/>
-    <p:sldId id="296" r:id="rId19"/>
-    <p:sldId id="287" r:id="rId20"/>
-    <p:sldId id="271" r:id="rId21"/>
-    <p:sldId id="288" r:id="rId22"/>
-    <p:sldId id="289" r:id="rId23"/>
-    <p:sldId id="290" r:id="rId24"/>
-    <p:sldId id="279" r:id="rId25"/>
-    <p:sldId id="278" r:id="rId26"/>
+    <p:sldId id="298" r:id="rId11"/>
+    <p:sldId id="293" r:id="rId12"/>
+    <p:sldId id="267" r:id="rId13"/>
+    <p:sldId id="281" r:id="rId14"/>
+    <p:sldId id="284" r:id="rId15"/>
+    <p:sldId id="285" r:id="rId16"/>
+    <p:sldId id="286" r:id="rId17"/>
+    <p:sldId id="294" r:id="rId18"/>
+    <p:sldId id="295" r:id="rId19"/>
+    <p:sldId id="296" r:id="rId20"/>
+    <p:sldId id="287" r:id="rId21"/>
+    <p:sldId id="271" r:id="rId22"/>
+    <p:sldId id="288" r:id="rId23"/>
+    <p:sldId id="289" r:id="rId24"/>
+    <p:sldId id="290" r:id="rId25"/>
+    <p:sldId id="279" r:id="rId26"/>
+    <p:sldId id="278" r:id="rId27"/>
   </p:sldIdLst>
   <p:sldSz cx="12192000" cy="6858000"/>
   <p:notesSz cx="6858000" cy="9144000"/>
@@ -649,7 +650,7 @@
     </p:spTree>
     <p:extLst>
       <p:ext uri="{BB962C8B-B14F-4D97-AF65-F5344CB8AC3E}">
-        <p14:creationId xmlns:p14="http://schemas.microsoft.com/office/powerpoint/2010/main" val="1466785990"/>
+        <p14:creationId xmlns:p14="http://schemas.microsoft.com/office/powerpoint/2010/main" val="2185821689"/>
       </p:ext>
     </p:extLst>
   </p:cSld>
@@ -724,7 +725,7 @@
           <a:p>
             <a:fld id="{0353ECB5-C94B-407F-AD7A-26630BC3CD61}" type="slidenum">
               <a:rPr lang="en-US" smtClean="0"/>
-              <a:t>19</a:t>
+              <a:t>16</a:t>
             </a:fld>
             <a:endParaRPr lang="en-US"/>
           </a:p>
@@ -733,7 +734,7 @@
     </p:spTree>
     <p:extLst>
       <p:ext uri="{BB962C8B-B14F-4D97-AF65-F5344CB8AC3E}">
-        <p14:creationId xmlns:p14="http://schemas.microsoft.com/office/powerpoint/2010/main" val="1886827901"/>
+        <p14:creationId xmlns:p14="http://schemas.microsoft.com/office/powerpoint/2010/main" val="1466785990"/>
       </p:ext>
     </p:extLst>
   </p:cSld>
@@ -817,7 +818,7 @@
     </p:spTree>
     <p:extLst>
       <p:ext uri="{BB962C8B-B14F-4D97-AF65-F5344CB8AC3E}">
-        <p14:creationId xmlns:p14="http://schemas.microsoft.com/office/powerpoint/2010/main" val="4081803674"/>
+        <p14:creationId xmlns:p14="http://schemas.microsoft.com/office/powerpoint/2010/main" val="1886827901"/>
       </p:ext>
     </p:extLst>
   </p:cSld>
@@ -901,7 +902,7 @@
     </p:spTree>
     <p:extLst>
       <p:ext uri="{BB962C8B-B14F-4D97-AF65-F5344CB8AC3E}">
-        <p14:creationId xmlns:p14="http://schemas.microsoft.com/office/powerpoint/2010/main" val="634981689"/>
+        <p14:creationId xmlns:p14="http://schemas.microsoft.com/office/powerpoint/2010/main" val="4081803674"/>
       </p:ext>
     </p:extLst>
   </p:cSld>
@@ -985,7 +986,7 @@
     </p:spTree>
     <p:extLst>
       <p:ext uri="{BB962C8B-B14F-4D97-AF65-F5344CB8AC3E}">
-        <p14:creationId xmlns:p14="http://schemas.microsoft.com/office/powerpoint/2010/main" val="2174412859"/>
+        <p14:creationId xmlns:p14="http://schemas.microsoft.com/office/powerpoint/2010/main" val="634981689"/>
       </p:ext>
     </p:extLst>
   </p:cSld>
@@ -1069,7 +1070,7 @@
     </p:spTree>
     <p:extLst>
       <p:ext uri="{BB962C8B-B14F-4D97-AF65-F5344CB8AC3E}">
-        <p14:creationId xmlns:p14="http://schemas.microsoft.com/office/powerpoint/2010/main" val="2677513843"/>
+        <p14:creationId xmlns:p14="http://schemas.microsoft.com/office/powerpoint/2010/main" val="2174412859"/>
       </p:ext>
     </p:extLst>
   </p:cSld>
@@ -1153,7 +1154,7 @@
     </p:spTree>
     <p:extLst>
       <p:ext uri="{BB962C8B-B14F-4D97-AF65-F5344CB8AC3E}">
-        <p14:creationId xmlns:p14="http://schemas.microsoft.com/office/powerpoint/2010/main" val="4156153016"/>
+        <p14:creationId xmlns:p14="http://schemas.microsoft.com/office/powerpoint/2010/main" val="2677513843"/>
       </p:ext>
     </p:extLst>
   </p:cSld>
@@ -1229,6 +1230,90 @@
             <a:fld id="{0353ECB5-C94B-407F-AD7A-26630BC3CD61}" type="slidenum">
               <a:rPr lang="en-US" smtClean="0"/>
               <a:t>25</a:t>
+            </a:fld>
+            <a:endParaRPr lang="en-US"/>
+          </a:p>
+        </p:txBody>
+      </p:sp>
+    </p:spTree>
+    <p:extLst>
+      <p:ext uri="{BB962C8B-B14F-4D97-AF65-F5344CB8AC3E}">
+        <p14:creationId xmlns:p14="http://schemas.microsoft.com/office/powerpoint/2010/main" val="4156153016"/>
+      </p:ext>
+    </p:extLst>
+  </p:cSld>
+  <p:clrMapOvr>
+    <a:masterClrMapping/>
+  </p:clrMapOvr>
+</p:notes>
+</file>
+
+<file path=ppt/notesSlides/notesSlide18.xml><?xml version="1.0" encoding="utf-8"?>
+<p:notes xmlns:a="http://schemas.openxmlformats.org/drawingml/2006/main" xmlns:r="http://schemas.openxmlformats.org/officeDocument/2006/relationships" xmlns:p="http://schemas.openxmlformats.org/presentationml/2006/main">
+  <p:cSld>
+    <p:spTree>
+      <p:nvGrpSpPr>
+        <p:cNvPr id="1" name=""/>
+        <p:cNvGrpSpPr/>
+        <p:nvPr/>
+      </p:nvGrpSpPr>
+      <p:grpSpPr>
+        <a:xfrm>
+          <a:off x="0" y="0"/>
+          <a:ext cx="0" cy="0"/>
+          <a:chOff x="0" y="0"/>
+          <a:chExt cx="0" cy="0"/>
+        </a:xfrm>
+      </p:grpSpPr>
+      <p:sp>
+        <p:nvSpPr>
+          <p:cNvPr id="2" name="Slide Image Placeholder 1"/>
+          <p:cNvSpPr>
+            <a:spLocks noGrp="1" noRot="1" noChangeAspect="1"/>
+          </p:cNvSpPr>
+          <p:nvPr>
+            <p:ph type="sldImg"/>
+          </p:nvPr>
+        </p:nvSpPr>
+        <p:spPr/>
+      </p:sp>
+      <p:sp>
+        <p:nvSpPr>
+          <p:cNvPr id="3" name="Notes Placeholder 2"/>
+          <p:cNvSpPr>
+            <a:spLocks noGrp="1"/>
+          </p:cNvSpPr>
+          <p:nvPr>
+            <p:ph type="body" idx="1"/>
+          </p:nvPr>
+        </p:nvSpPr>
+        <p:spPr/>
+        <p:txBody>
+          <a:bodyPr/>
+          <a:lstStyle/>
+          <a:p>
+            <a:endParaRPr lang="en-US" dirty="0"/>
+          </a:p>
+        </p:txBody>
+      </p:sp>
+      <p:sp>
+        <p:nvSpPr>
+          <p:cNvPr id="4" name="Slide Number Placeholder 3"/>
+          <p:cNvSpPr>
+            <a:spLocks noGrp="1"/>
+          </p:cNvSpPr>
+          <p:nvPr>
+            <p:ph type="sldNum" sz="quarter" idx="5"/>
+          </p:nvPr>
+        </p:nvSpPr>
+        <p:spPr/>
+        <p:txBody>
+          <a:bodyPr/>
+          <a:lstStyle/>
+          <a:p>
+            <a:fld id="{0353ECB5-C94B-407F-AD7A-26630BC3CD61}" type="slidenum">
+              <a:rPr lang="en-US" smtClean="0"/>
+              <a:t>26</a:t>
             </a:fld>
             <a:endParaRPr lang="en-US"/>
           </a:p>
@@ -1667,7 +1752,7 @@
           <a:p>
             <a:fld id="{0353ECB5-C94B-407F-AD7A-26630BC3CD61}" type="slidenum">
               <a:rPr lang="en-US" smtClean="0"/>
-              <a:t>11</a:t>
+              <a:t>10</a:t>
             </a:fld>
             <a:endParaRPr lang="en-US"/>
           </a:p>
@@ -1676,7 +1761,7 @@
     </p:spTree>
     <p:extLst>
       <p:ext uri="{BB962C8B-B14F-4D97-AF65-F5344CB8AC3E}">
-        <p14:creationId xmlns:p14="http://schemas.microsoft.com/office/powerpoint/2010/main" val="2726871449"/>
+        <p14:creationId xmlns:p14="http://schemas.microsoft.com/office/powerpoint/2010/main" val="1328364431"/>
       </p:ext>
     </p:extLst>
   </p:cSld>
@@ -1730,10 +1815,7 @@
           <a:bodyPr/>
           <a:lstStyle/>
           <a:p>
-            <a:r>
-              <a:rPr lang="en-US" dirty="0"/>
-              <a:t>Leland Wilkinson 2005 Professor of Computer Science</a:t>
-            </a:r>
+            <a:endParaRPr lang="en-US" dirty="0"/>
           </a:p>
         </p:txBody>
       </p:sp>
@@ -1763,7 +1845,7 @@
     </p:spTree>
     <p:extLst>
       <p:ext uri="{BB962C8B-B14F-4D97-AF65-F5344CB8AC3E}">
-        <p14:creationId xmlns:p14="http://schemas.microsoft.com/office/powerpoint/2010/main" val="2509429716"/>
+        <p14:creationId xmlns:p14="http://schemas.microsoft.com/office/powerpoint/2010/main" val="2726871449"/>
       </p:ext>
     </p:extLst>
   </p:cSld>
@@ -1817,7 +1899,10 @@
           <a:bodyPr/>
           <a:lstStyle/>
           <a:p>
-            <a:endParaRPr lang="en-US" dirty="0"/>
+            <a:r>
+              <a:rPr lang="en-US" dirty="0"/>
+              <a:t>Leland Wilkinson 2005 Professor of Computer Science</a:t>
+            </a:r>
           </a:p>
         </p:txBody>
       </p:sp>
@@ -1847,7 +1932,7 @@
     </p:spTree>
     <p:extLst>
       <p:ext uri="{BB962C8B-B14F-4D97-AF65-F5344CB8AC3E}">
-        <p14:creationId xmlns:p14="http://schemas.microsoft.com/office/powerpoint/2010/main" val="4049543512"/>
+        <p14:creationId xmlns:p14="http://schemas.microsoft.com/office/powerpoint/2010/main" val="2509429716"/>
       </p:ext>
     </p:extLst>
   </p:cSld>
@@ -1931,7 +2016,7 @@
     </p:spTree>
     <p:extLst>
       <p:ext uri="{BB962C8B-B14F-4D97-AF65-F5344CB8AC3E}">
-        <p14:creationId xmlns:p14="http://schemas.microsoft.com/office/powerpoint/2010/main" val="2185821689"/>
+        <p14:creationId xmlns:p14="http://schemas.microsoft.com/office/powerpoint/2010/main" val="4049543512"/>
       </p:ext>
     </p:extLst>
   </p:cSld>
@@ -5659,7 +5744,7 @@
       </p:grpSpPr>
       <p:sp>
         <p:nvSpPr>
-          <p:cNvPr id="21" name="Rectangle 20">
+          <p:cNvPr id="23" name="Rectangle 12">
             <a:extLst>
               <a:ext uri="{FF2B5EF4-FFF2-40B4-BE49-F238E27FC236}">
                 <a16:creationId xmlns:a16="http://schemas.microsoft.com/office/drawing/2014/main" id="{DE7FFD28-545C-4C88-A2E7-152FB234C92C}"/>
@@ -5725,6 +5810,219 @@
           <p:cNvPr id="2" name="Title 1">
             <a:extLst>
               <a:ext uri="{FF2B5EF4-FFF2-40B4-BE49-F238E27FC236}">
+                <a16:creationId xmlns:a16="http://schemas.microsoft.com/office/drawing/2014/main" id="{141CF270-13A8-4571-B4F0-7EA6D784E38D}"/>
+              </a:ext>
+            </a:extLst>
+          </p:cNvPr>
+          <p:cNvSpPr>
+            <a:spLocks noGrp="1"/>
+          </p:cNvSpPr>
+          <p:nvPr>
+            <p:ph type="title"/>
+          </p:nvPr>
+        </p:nvSpPr>
+        <p:spPr>
+          <a:xfrm>
+            <a:off x="838200" y="365125"/>
+            <a:ext cx="10515600" cy="1325563"/>
+          </a:xfrm>
+        </p:spPr>
+        <p:txBody>
+          <a:bodyPr>
+            <a:normAutofit/>
+          </a:bodyPr>
+          <a:lstStyle/>
+          <a:p>
+            <a:r>
+              <a:rPr lang="en-US" sz="4600" dirty="0">
+                <a:solidFill>
+                  <a:srgbClr val="FFFFFF"/>
+                </a:solidFill>
+              </a:rPr>
+              <a:t>Download Workshop Materials</a:t>
+            </a:r>
+          </a:p>
+        </p:txBody>
+      </p:sp>
+      <p:sp>
+        <p:nvSpPr>
+          <p:cNvPr id="3" name="Content Placeholder 2">
+            <a:extLst>
+              <a:ext uri="{FF2B5EF4-FFF2-40B4-BE49-F238E27FC236}">
+                <a16:creationId xmlns:a16="http://schemas.microsoft.com/office/drawing/2014/main" id="{56CE44A8-B5C8-4ECA-9C65-2AD6DDFC18F5}"/>
+              </a:ext>
+            </a:extLst>
+          </p:cNvPr>
+          <p:cNvSpPr>
+            <a:spLocks noGrp="1"/>
+          </p:cNvSpPr>
+          <p:nvPr>
+            <p:ph idx="1"/>
+          </p:nvPr>
+        </p:nvSpPr>
+        <p:spPr>
+          <a:xfrm>
+            <a:off x="838200" y="2438400"/>
+            <a:ext cx="10515600" cy="3738562"/>
+          </a:xfrm>
+        </p:spPr>
+        <p:txBody>
+          <a:bodyPr>
+            <a:normAutofit/>
+          </a:bodyPr>
+          <a:lstStyle/>
+          <a:p>
+            <a:r>
+              <a:rPr lang="en-US" sz="2600" dirty="0"/>
+              <a:t>Navigate to </a:t>
+            </a:r>
+            <a:r>
+              <a:rPr lang="en-US" sz="2600" dirty="0">
+                <a:hlinkClick r:id="rId3"/>
+              </a:rPr>
+              <a:t>https://github.com/pburnsdata/RWorkshop</a:t>
+            </a:r>
+            <a:endParaRPr lang="en-US" sz="2600" dirty="0"/>
+          </a:p>
+          <a:p>
+            <a:pPr marL="0" indent="0">
+              <a:buNone/>
+            </a:pPr>
+            <a:endParaRPr lang="en-US" dirty="0"/>
+          </a:p>
+          <a:p>
+            <a:endParaRPr lang="en-US" sz="2600" dirty="0"/>
+          </a:p>
+        </p:txBody>
+      </p:sp>
+      <p:pic>
+        <p:nvPicPr>
+          <p:cNvPr id="5" name="Picture 4">
+            <a:extLst>
+              <a:ext uri="{FF2B5EF4-FFF2-40B4-BE49-F238E27FC236}">
+                <a16:creationId xmlns:a16="http://schemas.microsoft.com/office/drawing/2014/main" id="{673AAA3B-D064-42B6-86BE-05585C8DE1E2}"/>
+              </a:ext>
+            </a:extLst>
+          </p:cNvPr>
+          <p:cNvPicPr>
+            <a:picLocks noChangeAspect="1"/>
+          </p:cNvPicPr>
+          <p:nvPr/>
+        </p:nvPicPr>
+        <p:blipFill>
+          <a:blip r:embed="rId4"/>
+          <a:stretch>
+            <a:fillRect/>
+          </a:stretch>
+        </p:blipFill>
+        <p:spPr>
+          <a:xfrm>
+            <a:off x="2267467" y="2909894"/>
+            <a:ext cx="7657067" cy="4127904"/>
+          </a:xfrm>
+          <a:prstGeom prst="rect">
+            <a:avLst/>
+          </a:prstGeom>
+        </p:spPr>
+      </p:pic>
+    </p:spTree>
+    <p:extLst>
+      <p:ext uri="{BB962C8B-B14F-4D97-AF65-F5344CB8AC3E}">
+        <p14:creationId xmlns:p14="http://schemas.microsoft.com/office/powerpoint/2010/main" val="3246863767"/>
+      </p:ext>
+    </p:extLst>
+  </p:cSld>
+  <p:clrMapOvr>
+    <a:masterClrMapping/>
+  </p:clrMapOvr>
+</p:sld>
+</file>
+
+<file path=ppt/slides/slide11.xml><?xml version="1.0" encoding="utf-8"?>
+<p:sld xmlns:a="http://schemas.openxmlformats.org/drawingml/2006/main" xmlns:r="http://schemas.openxmlformats.org/officeDocument/2006/relationships" xmlns:p="http://schemas.openxmlformats.org/presentationml/2006/main">
+  <p:cSld>
+    <p:spTree>
+      <p:nvGrpSpPr>
+        <p:cNvPr id="1" name=""/>
+        <p:cNvGrpSpPr/>
+        <p:nvPr/>
+      </p:nvGrpSpPr>
+      <p:grpSpPr>
+        <a:xfrm>
+          <a:off x="0" y="0"/>
+          <a:ext cx="0" cy="0"/>
+          <a:chOff x="0" y="0"/>
+          <a:chExt cx="0" cy="0"/>
+        </a:xfrm>
+      </p:grpSpPr>
+      <p:sp>
+        <p:nvSpPr>
+          <p:cNvPr id="21" name="Rectangle 20">
+            <a:extLst>
+              <a:ext uri="{FF2B5EF4-FFF2-40B4-BE49-F238E27FC236}">
+                <a16:creationId xmlns:a16="http://schemas.microsoft.com/office/drawing/2014/main" id="{DE7FFD28-545C-4C88-A2E7-152FB234C92C}"/>
+              </a:ext>
+              <a:ext uri="{C183D7F6-B498-43B3-948B-1728B52AA6E4}">
+                <adec:decorative xmlns:adec="http://schemas.microsoft.com/office/drawing/2017/decorative" val="1"/>
+              </a:ext>
+            </a:extLst>
+          </p:cNvPr>
+          <p:cNvSpPr>
+            <a:spLocks noGrp="1" noRot="1" noChangeAspect="1" noMove="1" noResize="1" noEditPoints="1" noAdjustHandles="1" noChangeArrowheads="1" noChangeShapeType="1" noTextEdit="1"/>
+          </p:cNvSpPr>
+          <p:nvPr>
+            <p:extLst>
+              <p:ext uri="{386F3935-93C4-4BCD-93E2-E3B085C9AB24}">
+                <p16:designElem xmlns:p16="http://schemas.microsoft.com/office/powerpoint/2015/main" val="1"/>
+              </p:ext>
+            </p:extLst>
+          </p:nvPr>
+        </p:nvSpPr>
+        <p:spPr>
+          <a:xfrm>
+            <a:off x="0" y="0"/>
+            <a:ext cx="12192000" cy="1911350"/>
+          </a:xfrm>
+          <a:prstGeom prst="rect">
+            <a:avLst/>
+          </a:prstGeom>
+          <a:solidFill>
+            <a:schemeClr val="accent5"/>
+          </a:solidFill>
+          <a:ln>
+            <a:noFill/>
+          </a:ln>
+        </p:spPr>
+        <p:style>
+          <a:lnRef idx="2">
+            <a:schemeClr val="accent1">
+              <a:shade val="50000"/>
+            </a:schemeClr>
+          </a:lnRef>
+          <a:fillRef idx="1">
+            <a:schemeClr val="accent1"/>
+          </a:fillRef>
+          <a:effectRef idx="0">
+            <a:schemeClr val="accent1"/>
+          </a:effectRef>
+          <a:fontRef idx="minor">
+            <a:schemeClr val="lt1"/>
+          </a:fontRef>
+        </p:style>
+        <p:txBody>
+          <a:bodyPr rtlCol="0" anchor="ctr"/>
+          <a:lstStyle/>
+          <a:p>
+            <a:pPr algn="ctr"/>
+            <a:endParaRPr lang="en-US"/>
+          </a:p>
+        </p:txBody>
+      </p:sp>
+      <p:sp>
+        <p:nvSpPr>
+          <p:cNvPr id="2" name="Title 1">
+            <a:extLst>
+              <a:ext uri="{FF2B5EF4-FFF2-40B4-BE49-F238E27FC236}">
                 <a16:creationId xmlns:a16="http://schemas.microsoft.com/office/drawing/2014/main" id="{C9F6A0E7-E973-46F9-97C7-2BD36C7E5828}"/>
               </a:ext>
             </a:extLst>
@@ -5851,7 +6149,7 @@
 </p:sld>
 </file>
 
-<file path=ppt/slides/slide11.xml><?xml version="1.0" encoding="utf-8"?>
+<file path=ppt/slides/slide12.xml><?xml version="1.0" encoding="utf-8"?>
 <p:sld xmlns:a="http://schemas.openxmlformats.org/drawingml/2006/main" xmlns:r="http://schemas.openxmlformats.org/officeDocument/2006/relationships" xmlns:p="http://schemas.openxmlformats.org/presentationml/2006/main">
   <p:cSld>
     <p:bg>
@@ -6058,7 +6356,7 @@
 </p:sld>
 </file>
 
-<file path=ppt/slides/slide12.xml><?xml version="1.0" encoding="utf-8"?>
+<file path=ppt/slides/slide13.xml><?xml version="1.0" encoding="utf-8"?>
 <p:sld xmlns:a="http://schemas.openxmlformats.org/drawingml/2006/main" xmlns:r="http://schemas.openxmlformats.org/officeDocument/2006/relationships" xmlns:p="http://schemas.openxmlformats.org/presentationml/2006/main">
   <p:cSld>
     <p:spTree>
@@ -6280,7 +6578,7 @@
 </p:sld>
 </file>
 
-<file path=ppt/slides/slide13.xml><?xml version="1.0" encoding="utf-8"?>
+<file path=ppt/slides/slide14.xml><?xml version="1.0" encoding="utf-8"?>
 <p:sld xmlns:a="http://schemas.openxmlformats.org/drawingml/2006/main" xmlns:r="http://schemas.openxmlformats.org/officeDocument/2006/relationships" xmlns:p="http://schemas.openxmlformats.org/presentationml/2006/main">
   <p:cSld>
     <p:spTree>
@@ -6592,7 +6890,7 @@
 </p:sld>
 </file>
 
-<file path=ppt/slides/slide14.xml><?xml version="1.0" encoding="utf-8"?>
+<file path=ppt/slides/slide15.xml><?xml version="1.0" encoding="utf-8"?>
 <p:sld xmlns:a="http://schemas.openxmlformats.org/drawingml/2006/main" xmlns:r="http://schemas.openxmlformats.org/officeDocument/2006/relationships" xmlns:p="http://schemas.openxmlformats.org/presentationml/2006/main">
   <p:cSld>
     <p:spTree>
@@ -7032,7 +7330,7 @@
 </p:sld>
 </file>
 
-<file path=ppt/slides/slide15.xml><?xml version="1.0" encoding="utf-8"?>
+<file path=ppt/slides/slide16.xml><?xml version="1.0" encoding="utf-8"?>
 <p:sld xmlns:a="http://schemas.openxmlformats.org/drawingml/2006/main" xmlns:r="http://schemas.openxmlformats.org/officeDocument/2006/relationships" xmlns:p="http://schemas.openxmlformats.org/presentationml/2006/main">
   <p:cSld>
     <p:spTree>
@@ -7434,7 +7732,7 @@
 </p:sld>
 </file>
 
-<file path=ppt/slides/slide16.xml><?xml version="1.0" encoding="utf-8"?>
+<file path=ppt/slides/slide17.xml><?xml version="1.0" encoding="utf-8"?>
 <p:sld xmlns:a="http://schemas.openxmlformats.org/drawingml/2006/main" xmlns:r="http://schemas.openxmlformats.org/officeDocument/2006/relationships" xmlns:p="http://schemas.openxmlformats.org/presentationml/2006/main">
   <p:cSld>
     <p:spTree>
@@ -7651,7 +7949,7 @@
 </p:sld>
 </file>
 
-<file path=ppt/slides/slide17.xml><?xml version="1.0" encoding="utf-8"?>
+<file path=ppt/slides/slide18.xml><?xml version="1.0" encoding="utf-8"?>
 <p:sld xmlns:a="http://schemas.openxmlformats.org/drawingml/2006/main" xmlns:r="http://schemas.openxmlformats.org/officeDocument/2006/relationships" xmlns:p="http://schemas.openxmlformats.org/presentationml/2006/main">
   <p:cSld>
     <p:spTree>
@@ -7868,7 +8166,7 @@
 </p:sld>
 </file>
 
-<file path=ppt/slides/slide18.xml><?xml version="1.0" encoding="utf-8"?>
+<file path=ppt/slides/slide19.xml><?xml version="1.0" encoding="utf-8"?>
 <p:sld xmlns:a="http://schemas.openxmlformats.org/drawingml/2006/main" xmlns:r="http://schemas.openxmlformats.org/officeDocument/2006/relationships" xmlns:p="http://schemas.openxmlformats.org/presentationml/2006/main">
   <p:cSld>
     <p:spTree>
@@ -8036,7 +8334,200 @@
 </p:sld>
 </file>
 
-<file path=ppt/slides/slide19.xml><?xml version="1.0" encoding="utf-8"?>
+<file path=ppt/slides/slide2.xml><?xml version="1.0" encoding="utf-8"?>
+<p:sld xmlns:a="http://schemas.openxmlformats.org/drawingml/2006/main" xmlns:r="http://schemas.openxmlformats.org/officeDocument/2006/relationships" xmlns:p="http://schemas.openxmlformats.org/presentationml/2006/main">
+  <p:cSld>
+    <p:spTree>
+      <p:nvGrpSpPr>
+        <p:cNvPr id="1" name=""/>
+        <p:cNvGrpSpPr/>
+        <p:nvPr/>
+      </p:nvGrpSpPr>
+      <p:grpSpPr>
+        <a:xfrm>
+          <a:off x="0" y="0"/>
+          <a:ext cx="0" cy="0"/>
+          <a:chOff x="0" y="0"/>
+          <a:chExt cx="0" cy="0"/>
+        </a:xfrm>
+      </p:grpSpPr>
+      <p:sp>
+        <p:nvSpPr>
+          <p:cNvPr id="21" name="Rectangle 20">
+            <a:extLst>
+              <a:ext uri="{FF2B5EF4-FFF2-40B4-BE49-F238E27FC236}">
+                <a16:creationId xmlns:a16="http://schemas.microsoft.com/office/drawing/2014/main" id="{DE7FFD28-545C-4C88-A2E7-152FB234C92C}"/>
+              </a:ext>
+              <a:ext uri="{C183D7F6-B498-43B3-948B-1728B52AA6E4}">
+                <adec:decorative xmlns:adec="http://schemas.microsoft.com/office/drawing/2017/decorative" val="1"/>
+              </a:ext>
+            </a:extLst>
+          </p:cNvPr>
+          <p:cNvSpPr>
+            <a:spLocks noGrp="1" noRot="1" noChangeAspect="1" noMove="1" noResize="1" noEditPoints="1" noAdjustHandles="1" noChangeArrowheads="1" noChangeShapeType="1" noTextEdit="1"/>
+          </p:cNvSpPr>
+          <p:nvPr>
+            <p:extLst>
+              <p:ext uri="{386F3935-93C4-4BCD-93E2-E3B085C9AB24}">
+                <p16:designElem xmlns:p16="http://schemas.microsoft.com/office/powerpoint/2015/main" val="1"/>
+              </p:ext>
+            </p:extLst>
+          </p:nvPr>
+        </p:nvSpPr>
+        <p:spPr>
+          <a:xfrm>
+            <a:off x="0" y="0"/>
+            <a:ext cx="12192000" cy="1911350"/>
+          </a:xfrm>
+          <a:prstGeom prst="rect">
+            <a:avLst/>
+          </a:prstGeom>
+          <a:solidFill>
+            <a:schemeClr val="accent5"/>
+          </a:solidFill>
+          <a:ln>
+            <a:noFill/>
+          </a:ln>
+        </p:spPr>
+        <p:style>
+          <a:lnRef idx="2">
+            <a:schemeClr val="accent1">
+              <a:shade val="50000"/>
+            </a:schemeClr>
+          </a:lnRef>
+          <a:fillRef idx="1">
+            <a:schemeClr val="accent1"/>
+          </a:fillRef>
+          <a:effectRef idx="0">
+            <a:schemeClr val="accent1"/>
+          </a:effectRef>
+          <a:fontRef idx="minor">
+            <a:schemeClr val="lt1"/>
+          </a:fontRef>
+        </p:style>
+        <p:txBody>
+          <a:bodyPr rtlCol="0" anchor="ctr"/>
+          <a:lstStyle/>
+          <a:p>
+            <a:pPr algn="ctr"/>
+            <a:endParaRPr lang="en-US"/>
+          </a:p>
+        </p:txBody>
+      </p:sp>
+      <p:sp>
+        <p:nvSpPr>
+          <p:cNvPr id="2" name="Title 1">
+            <a:extLst>
+              <a:ext uri="{FF2B5EF4-FFF2-40B4-BE49-F238E27FC236}">
+                <a16:creationId xmlns:a16="http://schemas.microsoft.com/office/drawing/2014/main" id="{C9F6A0E7-E973-46F9-97C7-2BD36C7E5828}"/>
+              </a:ext>
+            </a:extLst>
+          </p:cNvPr>
+          <p:cNvSpPr>
+            <a:spLocks noGrp="1"/>
+          </p:cNvSpPr>
+          <p:nvPr>
+            <p:ph type="title"/>
+          </p:nvPr>
+        </p:nvSpPr>
+        <p:spPr>
+          <a:xfrm>
+            <a:off x="838200" y="365125"/>
+            <a:ext cx="10515600" cy="1325563"/>
+          </a:xfrm>
+        </p:spPr>
+        <p:txBody>
+          <a:bodyPr>
+            <a:normAutofit/>
+          </a:bodyPr>
+          <a:lstStyle/>
+          <a:p>
+            <a:r>
+              <a:rPr lang="en-US" sz="4600" dirty="0">
+                <a:solidFill>
+                  <a:srgbClr val="FFFFFF"/>
+                </a:solidFill>
+              </a:rPr>
+              <a:t>Agenda</a:t>
+            </a:r>
+          </a:p>
+        </p:txBody>
+      </p:sp>
+      <p:sp>
+        <p:nvSpPr>
+          <p:cNvPr id="3" name="Content Placeholder 2">
+            <a:extLst>
+              <a:ext uri="{FF2B5EF4-FFF2-40B4-BE49-F238E27FC236}">
+                <a16:creationId xmlns:a16="http://schemas.microsoft.com/office/drawing/2014/main" id="{881784C5-D96D-4168-885A-6514436AA9D3}"/>
+              </a:ext>
+            </a:extLst>
+          </p:cNvPr>
+          <p:cNvSpPr>
+            <a:spLocks noGrp="1"/>
+          </p:cNvSpPr>
+          <p:nvPr>
+            <p:ph idx="1"/>
+          </p:nvPr>
+        </p:nvSpPr>
+        <p:spPr>
+          <a:xfrm>
+            <a:off x="838200" y="2438400"/>
+            <a:ext cx="10515600" cy="3738562"/>
+          </a:xfrm>
+        </p:spPr>
+        <p:txBody>
+          <a:bodyPr>
+            <a:normAutofit/>
+          </a:bodyPr>
+          <a:lstStyle/>
+          <a:p>
+            <a:r>
+              <a:rPr lang="en-US" dirty="0"/>
+              <a:t>R statistical programming language workshop</a:t>
+            </a:r>
+          </a:p>
+          <a:p>
+            <a:pPr lvl="1"/>
+            <a:r>
+              <a:rPr lang="en-US" sz="2800" dirty="0"/>
+              <a:t>Introduction and Installation of R</a:t>
+            </a:r>
+          </a:p>
+          <a:p>
+            <a:pPr lvl="1"/>
+            <a:r>
+              <a:rPr lang="en-US" sz="2800" dirty="0"/>
+              <a:t>Workshop</a:t>
+            </a:r>
+          </a:p>
+          <a:p>
+            <a:r>
+              <a:rPr lang="en-US" dirty="0"/>
+              <a:t>Lunch</a:t>
+            </a:r>
+          </a:p>
+          <a:p>
+            <a:r>
+              <a:rPr lang="en-US" dirty="0"/>
+              <a:t>Visualizations in Clinical Research: A CRO Perspective </a:t>
+            </a:r>
+          </a:p>
+        </p:txBody>
+      </p:sp>
+    </p:spTree>
+    <p:extLst>
+      <p:ext uri="{BB962C8B-B14F-4D97-AF65-F5344CB8AC3E}">
+        <p14:creationId xmlns:p14="http://schemas.microsoft.com/office/powerpoint/2010/main" val="1222165478"/>
+      </p:ext>
+    </p:extLst>
+  </p:cSld>
+  <p:clrMapOvr>
+    <a:masterClrMapping/>
+  </p:clrMapOvr>
+</p:sld>
+</file>
+
+<file path=ppt/slides/slide20.xml><?xml version="1.0" encoding="utf-8"?>
 <p:sld xmlns:a="http://schemas.openxmlformats.org/drawingml/2006/main" xmlns:r="http://schemas.openxmlformats.org/officeDocument/2006/relationships" xmlns:p="http://schemas.openxmlformats.org/presentationml/2006/main">
   <p:cSld>
     <p:spTree>
@@ -8439,200 +8930,7 @@
 </p:sld>
 </file>
 
-<file path=ppt/slides/slide2.xml><?xml version="1.0" encoding="utf-8"?>
-<p:sld xmlns:a="http://schemas.openxmlformats.org/drawingml/2006/main" xmlns:r="http://schemas.openxmlformats.org/officeDocument/2006/relationships" xmlns:p="http://schemas.openxmlformats.org/presentationml/2006/main">
-  <p:cSld>
-    <p:spTree>
-      <p:nvGrpSpPr>
-        <p:cNvPr id="1" name=""/>
-        <p:cNvGrpSpPr/>
-        <p:nvPr/>
-      </p:nvGrpSpPr>
-      <p:grpSpPr>
-        <a:xfrm>
-          <a:off x="0" y="0"/>
-          <a:ext cx="0" cy="0"/>
-          <a:chOff x="0" y="0"/>
-          <a:chExt cx="0" cy="0"/>
-        </a:xfrm>
-      </p:grpSpPr>
-      <p:sp>
-        <p:nvSpPr>
-          <p:cNvPr id="21" name="Rectangle 20">
-            <a:extLst>
-              <a:ext uri="{FF2B5EF4-FFF2-40B4-BE49-F238E27FC236}">
-                <a16:creationId xmlns:a16="http://schemas.microsoft.com/office/drawing/2014/main" id="{DE7FFD28-545C-4C88-A2E7-152FB234C92C}"/>
-              </a:ext>
-              <a:ext uri="{C183D7F6-B498-43B3-948B-1728B52AA6E4}">
-                <adec:decorative xmlns:adec="http://schemas.microsoft.com/office/drawing/2017/decorative" val="1"/>
-              </a:ext>
-            </a:extLst>
-          </p:cNvPr>
-          <p:cNvSpPr>
-            <a:spLocks noGrp="1" noRot="1" noChangeAspect="1" noMove="1" noResize="1" noEditPoints="1" noAdjustHandles="1" noChangeArrowheads="1" noChangeShapeType="1" noTextEdit="1"/>
-          </p:cNvSpPr>
-          <p:nvPr>
-            <p:extLst>
-              <p:ext uri="{386F3935-93C4-4BCD-93E2-E3B085C9AB24}">
-                <p16:designElem xmlns:p16="http://schemas.microsoft.com/office/powerpoint/2015/main" val="1"/>
-              </p:ext>
-            </p:extLst>
-          </p:nvPr>
-        </p:nvSpPr>
-        <p:spPr>
-          <a:xfrm>
-            <a:off x="0" y="0"/>
-            <a:ext cx="12192000" cy="1911350"/>
-          </a:xfrm>
-          <a:prstGeom prst="rect">
-            <a:avLst/>
-          </a:prstGeom>
-          <a:solidFill>
-            <a:schemeClr val="accent5"/>
-          </a:solidFill>
-          <a:ln>
-            <a:noFill/>
-          </a:ln>
-        </p:spPr>
-        <p:style>
-          <a:lnRef idx="2">
-            <a:schemeClr val="accent1">
-              <a:shade val="50000"/>
-            </a:schemeClr>
-          </a:lnRef>
-          <a:fillRef idx="1">
-            <a:schemeClr val="accent1"/>
-          </a:fillRef>
-          <a:effectRef idx="0">
-            <a:schemeClr val="accent1"/>
-          </a:effectRef>
-          <a:fontRef idx="minor">
-            <a:schemeClr val="lt1"/>
-          </a:fontRef>
-        </p:style>
-        <p:txBody>
-          <a:bodyPr rtlCol="0" anchor="ctr"/>
-          <a:lstStyle/>
-          <a:p>
-            <a:pPr algn="ctr"/>
-            <a:endParaRPr lang="en-US"/>
-          </a:p>
-        </p:txBody>
-      </p:sp>
-      <p:sp>
-        <p:nvSpPr>
-          <p:cNvPr id="2" name="Title 1">
-            <a:extLst>
-              <a:ext uri="{FF2B5EF4-FFF2-40B4-BE49-F238E27FC236}">
-                <a16:creationId xmlns:a16="http://schemas.microsoft.com/office/drawing/2014/main" id="{C9F6A0E7-E973-46F9-97C7-2BD36C7E5828}"/>
-              </a:ext>
-            </a:extLst>
-          </p:cNvPr>
-          <p:cNvSpPr>
-            <a:spLocks noGrp="1"/>
-          </p:cNvSpPr>
-          <p:nvPr>
-            <p:ph type="title"/>
-          </p:nvPr>
-        </p:nvSpPr>
-        <p:spPr>
-          <a:xfrm>
-            <a:off x="838200" y="365125"/>
-            <a:ext cx="10515600" cy="1325563"/>
-          </a:xfrm>
-        </p:spPr>
-        <p:txBody>
-          <a:bodyPr>
-            <a:normAutofit/>
-          </a:bodyPr>
-          <a:lstStyle/>
-          <a:p>
-            <a:r>
-              <a:rPr lang="en-US" sz="4600" dirty="0">
-                <a:solidFill>
-                  <a:srgbClr val="FFFFFF"/>
-                </a:solidFill>
-              </a:rPr>
-              <a:t>Agenda</a:t>
-            </a:r>
-          </a:p>
-        </p:txBody>
-      </p:sp>
-      <p:sp>
-        <p:nvSpPr>
-          <p:cNvPr id="3" name="Content Placeholder 2">
-            <a:extLst>
-              <a:ext uri="{FF2B5EF4-FFF2-40B4-BE49-F238E27FC236}">
-                <a16:creationId xmlns:a16="http://schemas.microsoft.com/office/drawing/2014/main" id="{881784C5-D96D-4168-885A-6514436AA9D3}"/>
-              </a:ext>
-            </a:extLst>
-          </p:cNvPr>
-          <p:cNvSpPr>
-            <a:spLocks noGrp="1"/>
-          </p:cNvSpPr>
-          <p:nvPr>
-            <p:ph idx="1"/>
-          </p:nvPr>
-        </p:nvSpPr>
-        <p:spPr>
-          <a:xfrm>
-            <a:off x="838200" y="2438400"/>
-            <a:ext cx="10515600" cy="3738562"/>
-          </a:xfrm>
-        </p:spPr>
-        <p:txBody>
-          <a:bodyPr>
-            <a:normAutofit/>
-          </a:bodyPr>
-          <a:lstStyle/>
-          <a:p>
-            <a:r>
-              <a:rPr lang="en-US" dirty="0"/>
-              <a:t>R statistical programming language workshop</a:t>
-            </a:r>
-          </a:p>
-          <a:p>
-            <a:pPr lvl="1"/>
-            <a:r>
-              <a:rPr lang="en-US" sz="2800" dirty="0"/>
-              <a:t>Introduction and Installation of R</a:t>
-            </a:r>
-          </a:p>
-          <a:p>
-            <a:pPr lvl="1"/>
-            <a:r>
-              <a:rPr lang="en-US" sz="2800" dirty="0"/>
-              <a:t>Workshop</a:t>
-            </a:r>
-          </a:p>
-          <a:p>
-            <a:r>
-              <a:rPr lang="en-US" dirty="0"/>
-              <a:t>Lunch</a:t>
-            </a:r>
-          </a:p>
-          <a:p>
-            <a:r>
-              <a:rPr lang="en-US" dirty="0"/>
-              <a:t>Visualizations in Clinical Research: A CRO Perspective </a:t>
-            </a:r>
-          </a:p>
-        </p:txBody>
-      </p:sp>
-    </p:spTree>
-    <p:extLst>
-      <p:ext uri="{BB962C8B-B14F-4D97-AF65-F5344CB8AC3E}">
-        <p14:creationId xmlns:p14="http://schemas.microsoft.com/office/powerpoint/2010/main" val="1222165478"/>
-      </p:ext>
-    </p:extLst>
-  </p:cSld>
-  <p:clrMapOvr>
-    <a:masterClrMapping/>
-  </p:clrMapOvr>
-</p:sld>
-</file>
-
-<file path=ppt/slides/slide20.xml><?xml version="1.0" encoding="utf-8"?>
+<file path=ppt/slides/slide21.xml><?xml version="1.0" encoding="utf-8"?>
 <p:sld xmlns:a="http://schemas.openxmlformats.org/drawingml/2006/main" xmlns:r="http://schemas.openxmlformats.org/officeDocument/2006/relationships" xmlns:p="http://schemas.openxmlformats.org/presentationml/2006/main">
   <p:cSld>
     <p:spTree>
@@ -9020,7 +9318,7 @@
 </p:sld>
 </file>
 
-<file path=ppt/slides/slide21.xml><?xml version="1.0" encoding="utf-8"?>
+<file path=ppt/slides/slide22.xml><?xml version="1.0" encoding="utf-8"?>
 <p:sld xmlns:a="http://schemas.openxmlformats.org/drawingml/2006/main" xmlns:r="http://schemas.openxmlformats.org/officeDocument/2006/relationships" xmlns:p="http://schemas.openxmlformats.org/presentationml/2006/main">
   <p:cSld>
     <p:spTree>
@@ -9408,7 +9706,7 @@
 </p:sld>
 </file>
 
-<file path=ppt/slides/slide22.xml><?xml version="1.0" encoding="utf-8"?>
+<file path=ppt/slides/slide23.xml><?xml version="1.0" encoding="utf-8"?>
 <p:sld xmlns:a="http://schemas.openxmlformats.org/drawingml/2006/main" xmlns:r="http://schemas.openxmlformats.org/officeDocument/2006/relationships" xmlns:p="http://schemas.openxmlformats.org/presentationml/2006/main">
   <p:cSld>
     <p:spTree>
@@ -9796,7 +10094,7 @@
 </p:sld>
 </file>
 
-<file path=ppt/slides/slide23.xml><?xml version="1.0" encoding="utf-8"?>
+<file path=ppt/slides/slide24.xml><?xml version="1.0" encoding="utf-8"?>
 <p:sld xmlns:a="http://schemas.openxmlformats.org/drawingml/2006/main" xmlns:r="http://schemas.openxmlformats.org/officeDocument/2006/relationships" xmlns:p="http://schemas.openxmlformats.org/presentationml/2006/main">
   <p:cSld>
     <p:spTree>
@@ -10184,7 +10482,7 @@
 </p:sld>
 </file>
 
-<file path=ppt/slides/slide24.xml><?xml version="1.0" encoding="utf-8"?>
+<file path=ppt/slides/slide25.xml><?xml version="1.0" encoding="utf-8"?>
 <p:sld xmlns:a="http://schemas.openxmlformats.org/drawingml/2006/main" xmlns:r="http://schemas.openxmlformats.org/officeDocument/2006/relationships" xmlns:p="http://schemas.openxmlformats.org/presentationml/2006/main">
   <p:cSld>
     <p:spTree>
@@ -10404,7 +10702,7 @@
 </p:sld>
 </file>
 
-<file path=ppt/slides/slide25.xml><?xml version="1.0" encoding="utf-8"?>
+<file path=ppt/slides/slide26.xml><?xml version="1.0" encoding="utf-8"?>
 <p:sld xmlns:a="http://schemas.openxmlformats.org/drawingml/2006/main" xmlns:r="http://schemas.openxmlformats.org/officeDocument/2006/relationships" xmlns:p="http://schemas.openxmlformats.org/presentationml/2006/main">
   <p:cSld>
     <p:bg>

</xml_diff>

<commit_message>
Clean up and add links
</commit_message>
<xml_diff>
--- a/Leveraging Data in Clinical Research_R Workshop & Clinical Trial Visualizations_.pptx
+++ b/Leveraging Data in Clinical Research_R Workshop & Clinical Trial Visualizations_.pptx
@@ -15,9 +15,9 @@
     <p:sldId id="259" r:id="rId6"/>
     <p:sldId id="258" r:id="rId7"/>
     <p:sldId id="261" r:id="rId8"/>
-    <p:sldId id="265" r:id="rId9"/>
-    <p:sldId id="266" r:id="rId10"/>
-    <p:sldId id="298" r:id="rId11"/>
+    <p:sldId id="298" r:id="rId9"/>
+    <p:sldId id="265" r:id="rId10"/>
+    <p:sldId id="266" r:id="rId11"/>
     <p:sldId id="293" r:id="rId12"/>
     <p:sldId id="267" r:id="rId13"/>
     <p:sldId id="281" r:id="rId14"/>
@@ -535,7 +535,7 @@
           <a:p>
             <a:r>
               <a:rPr lang="en-US" dirty="0"/>
-              <a:t>Today is about getting feet wet and sharing my world like you’ve shared mine with me and taught me – resources to learn</a:t>
+              <a:t>Today is about getting feet wet and sharing like you’ve shared with me and taught me – sparking ideas, providing resources</a:t>
             </a:r>
           </a:p>
         </p:txBody>
@@ -1465,7 +1465,7 @@
           <a:p>
             <a:r>
               <a:rPr lang="en-US" dirty="0"/>
-              <a:t>Everything I share today is open source – cant shar confidential stuff –everything is my opinion </a:t>
+              <a:t>Everything I share today is open source – cant share confidential stuff –everything is my opinion </a:t>
             </a:r>
             <a:r>
               <a:rPr lang="en-US" dirty="0" err="1"/>
@@ -1593,7 +1593,7 @@
     </p:spTree>
     <p:extLst>
       <p:ext uri="{BB962C8B-B14F-4D97-AF65-F5344CB8AC3E}">
-        <p14:creationId xmlns:p14="http://schemas.microsoft.com/office/powerpoint/2010/main" val="824756753"/>
+        <p14:creationId xmlns:p14="http://schemas.microsoft.com/office/powerpoint/2010/main" val="1328364431"/>
       </p:ext>
     </p:extLst>
   </p:cSld>
@@ -1677,7 +1677,7 @@
     </p:spTree>
     <p:extLst>
       <p:ext uri="{BB962C8B-B14F-4D97-AF65-F5344CB8AC3E}">
-        <p14:creationId xmlns:p14="http://schemas.microsoft.com/office/powerpoint/2010/main" val="1758210029"/>
+        <p14:creationId xmlns:p14="http://schemas.microsoft.com/office/powerpoint/2010/main" val="824756753"/>
       </p:ext>
     </p:extLst>
   </p:cSld>
@@ -1761,7 +1761,7 @@
     </p:spTree>
     <p:extLst>
       <p:ext uri="{BB962C8B-B14F-4D97-AF65-F5344CB8AC3E}">
-        <p14:creationId xmlns:p14="http://schemas.microsoft.com/office/powerpoint/2010/main" val="1328364431"/>
+        <p14:creationId xmlns:p14="http://schemas.microsoft.com/office/powerpoint/2010/main" val="1758210029"/>
       </p:ext>
     </p:extLst>
   </p:cSld>
@@ -5839,8 +5839,21 @@
                   <a:srgbClr val="FFFFFF"/>
                 </a:solidFill>
               </a:rPr>
-              <a:t>Download Workshop Materials</a:t>
-            </a:r>
+              <a:t>Installing </a:t>
+            </a:r>
+            <a:r>
+              <a:rPr lang="en-US" sz="4600" dirty="0" err="1">
+                <a:solidFill>
+                  <a:srgbClr val="FFFFFF"/>
+                </a:solidFill>
+              </a:rPr>
+              <a:t>Rstudio</a:t>
+            </a:r>
+            <a:endParaRPr lang="en-US" sz="4600" dirty="0">
+              <a:solidFill>
+                <a:srgbClr val="FFFFFF"/>
+              </a:solidFill>
+            </a:endParaRPr>
           </a:p>
         </p:txBody>
       </p:sp>
@@ -5877,17 +5890,15 @@
               <a:t>Navigate to </a:t>
             </a:r>
             <a:r>
-              <a:rPr lang="en-US" sz="2600" dirty="0">
+              <a:rPr lang="en-US" u="sng" dirty="0">
                 <a:hlinkClick r:id="rId3"/>
               </a:rPr>
-              <a:t>https://github.com/pburnsdata/RWorkshop</a:t>
-            </a:r>
-            <a:endParaRPr lang="en-US" sz="2600" dirty="0"/>
-          </a:p>
-          <a:p>
-            <a:pPr marL="0" indent="0">
-              <a:buNone/>
-            </a:pPr>
+              <a:t>https://www.rstudio.com/products/rstudio/download/#download</a:t>
+            </a:r>
+            <a:r>
+              <a:rPr lang="en-US" sz="2600" dirty="0"/>
+              <a:t> </a:t>
+            </a:r>
             <a:endParaRPr lang="en-US" dirty="0"/>
           </a:p>
           <a:p>
@@ -5897,10 +5908,10 @@
       </p:sp>
       <p:pic>
         <p:nvPicPr>
-          <p:cNvPr id="5" name="Picture 4">
-            <a:extLst>
-              <a:ext uri="{FF2B5EF4-FFF2-40B4-BE49-F238E27FC236}">
-                <a16:creationId xmlns:a16="http://schemas.microsoft.com/office/drawing/2014/main" id="{673AAA3B-D064-42B6-86BE-05585C8DE1E2}"/>
+          <p:cNvPr id="4" name="Picture 3">
+            <a:extLst>
+              <a:ext uri="{FF2B5EF4-FFF2-40B4-BE49-F238E27FC236}">
+                <a16:creationId xmlns:a16="http://schemas.microsoft.com/office/drawing/2014/main" id="{A13558EE-837F-45BA-879C-B105B788E5CF}"/>
               </a:ext>
             </a:extLst>
           </p:cNvPr>
@@ -5917,8 +5928,8 @@
         </p:blipFill>
         <p:spPr>
           <a:xfrm>
-            <a:off x="2267467" y="2909894"/>
-            <a:ext cx="7657067" cy="4127904"/>
+            <a:off x="1553589" y="3429000"/>
+            <a:ext cx="9800211" cy="3823491"/>
           </a:xfrm>
           <a:prstGeom prst="rect">
             <a:avLst/>
@@ -5928,7 +5939,7 @@
     </p:spTree>
     <p:extLst>
       <p:ext uri="{BB962C8B-B14F-4D97-AF65-F5344CB8AC3E}">
-        <p14:creationId xmlns:p14="http://schemas.microsoft.com/office/powerpoint/2010/main" val="3246863767"/>
+        <p14:creationId xmlns:p14="http://schemas.microsoft.com/office/powerpoint/2010/main" val="485545247"/>
       </p:ext>
     </p:extLst>
   </p:cSld>
@@ -8656,18 +8667,13 @@
           <a:p>
             <a:pPr algn="ctr"/>
             <a:r>
-              <a:rPr lang="en-US" sz="5400">
+              <a:rPr lang="en-US" sz="5400" dirty="0">
                 <a:solidFill>
                   <a:schemeClr val="bg1"/>
                 </a:solidFill>
               </a:rPr>
               <a:t>Participant Visit Listing</a:t>
             </a:r>
-            <a:endParaRPr lang="en-US" sz="5400" dirty="0">
-              <a:solidFill>
-                <a:schemeClr val="bg1"/>
-              </a:solidFill>
-            </a:endParaRPr>
           </a:p>
         </p:txBody>
       </p:sp>
@@ -8890,6 +8896,7 @@
       <p:pic>
         <p:nvPicPr>
           <p:cNvPr id="6" name="Picture 5">
+            <a:hlinkClick r:id="rId3"/>
             <a:extLst>
               <a:ext uri="{FF2B5EF4-FFF2-40B4-BE49-F238E27FC236}">
                 <a16:creationId xmlns:a16="http://schemas.microsoft.com/office/drawing/2014/main" id="{80C84920-4457-4BEB-8C21-0B2DBB950717}"/>
@@ -8902,7 +8909,7 @@
           <p:nvPr/>
         </p:nvPicPr>
         <p:blipFill>
-          <a:blip r:embed="rId3"/>
+          <a:blip r:embed="rId4"/>
           <a:stretch>
             <a:fillRect/>
           </a:stretch>
@@ -9013,6 +9020,7 @@
       <p:pic>
         <p:nvPicPr>
           <p:cNvPr id="4" name="Picture 3">
+            <a:hlinkClick r:id="rId3"/>
             <a:extLst>
               <a:ext uri="{FF2B5EF4-FFF2-40B4-BE49-F238E27FC236}">
                 <a16:creationId xmlns:a16="http://schemas.microsoft.com/office/drawing/2014/main" id="{2369AA8B-D84E-4BEF-8725-09884AA088E6}"/>
@@ -9025,7 +9033,7 @@
           <p:nvPr/>
         </p:nvPicPr>
         <p:blipFill>
-          <a:blip r:embed="rId3"/>
+          <a:blip r:embed="rId4"/>
           <a:stretch>
             <a:fillRect/>
           </a:stretch>
@@ -9666,6 +9674,7 @@
       <p:pic>
         <p:nvPicPr>
           <p:cNvPr id="6" name="Picture 5">
+            <a:hlinkClick r:id="rId3"/>
             <a:extLst>
               <a:ext uri="{FF2B5EF4-FFF2-40B4-BE49-F238E27FC236}">
                 <a16:creationId xmlns:a16="http://schemas.microsoft.com/office/drawing/2014/main" id="{9D6F16B5-C9D2-48ED-9EA0-50F66F4FAF64}"/>
@@ -9678,7 +9687,7 @@
           <p:nvPr/>
         </p:nvPicPr>
         <p:blipFill>
-          <a:blip r:embed="rId3"/>
+          <a:blip r:embed="rId4"/>
           <a:stretch>
             <a:fillRect/>
           </a:stretch>
@@ -10054,6 +10063,7 @@
       <p:pic>
         <p:nvPicPr>
           <p:cNvPr id="2" name="Picture 1">
+            <a:hlinkClick r:id="rId3"/>
             <a:extLst>
               <a:ext uri="{FF2B5EF4-FFF2-40B4-BE49-F238E27FC236}">
                 <a16:creationId xmlns:a16="http://schemas.microsoft.com/office/drawing/2014/main" id="{7CE6E1BF-EF7D-4B23-94F9-698B8B30E004}"/>
@@ -10066,7 +10076,7 @@
           <p:nvPr/>
         </p:nvPicPr>
         <p:blipFill>
-          <a:blip r:embed="rId3"/>
+          <a:blip r:embed="rId4"/>
           <a:stretch>
             <a:fillRect/>
           </a:stretch>
@@ -10442,6 +10452,7 @@
       <p:pic>
         <p:nvPicPr>
           <p:cNvPr id="3" name="Picture 2">
+            <a:hlinkClick r:id="rId3"/>
             <a:extLst>
               <a:ext uri="{FF2B5EF4-FFF2-40B4-BE49-F238E27FC236}">
                 <a16:creationId xmlns:a16="http://schemas.microsoft.com/office/drawing/2014/main" id="{064F806E-C1C2-4DD4-81C7-D9472A1BA8AB}"/>
@@ -10454,7 +10465,7 @@
           <p:nvPr/>
         </p:nvPicPr>
         <p:blipFill>
-          <a:blip r:embed="rId3"/>
+          <a:blip r:embed="rId4"/>
           <a:stretch>
             <a:fillRect/>
           </a:stretch>
@@ -11535,7 +11546,7 @@
           <a:p>
             <a:r>
               <a:rPr lang="en-US" sz="2600" dirty="0"/>
-              <a:t>Wife is training to be OBGYN </a:t>
+              <a:t>Wife is training to be an OBGYN </a:t>
             </a:r>
           </a:p>
           <a:p>
@@ -11688,13 +11699,18 @@
           <a:lstStyle/>
           <a:p>
             <a:r>
-              <a:rPr lang="en-US" sz="4600" dirty="0">
+              <a:rPr lang="en-US" sz="4600">
                 <a:solidFill>
                   <a:srgbClr val="FFFFFF"/>
                 </a:solidFill>
               </a:rPr>
               <a:t>What is R?</a:t>
             </a:r>
+            <a:endParaRPr lang="en-US" sz="4600" dirty="0">
+              <a:solidFill>
+                <a:srgbClr val="FFFFFF"/>
+              </a:solidFill>
+            </a:endParaRPr>
           </a:p>
         </p:txBody>
       </p:sp>
@@ -11767,6 +11783,64 @@
               <a:buNone/>
             </a:pPr>
             <a:endParaRPr lang="en-US" sz="2600" dirty="0"/>
+          </a:p>
+        </p:txBody>
+      </p:sp>
+      <p:pic>
+        <p:nvPicPr>
+          <p:cNvPr id="4" name="Picture 3">
+            <a:extLst>
+              <a:ext uri="{FF2B5EF4-FFF2-40B4-BE49-F238E27FC236}">
+                <a16:creationId xmlns:a16="http://schemas.microsoft.com/office/drawing/2014/main" id="{6B7CF0B7-B512-43DF-A545-4A343F15A6EC}"/>
+              </a:ext>
+            </a:extLst>
+          </p:cNvPr>
+          <p:cNvPicPr>
+            <a:picLocks noChangeAspect="1"/>
+          </p:cNvPicPr>
+          <p:nvPr/>
+        </p:nvPicPr>
+        <p:blipFill>
+          <a:blip r:embed="rId2"/>
+          <a:stretch>
+            <a:fillRect/>
+          </a:stretch>
+        </p:blipFill>
+        <p:spPr>
+          <a:xfrm>
+            <a:off x="9631809" y="279400"/>
+            <a:ext cx="1866900" cy="1352550"/>
+          </a:xfrm>
+          <a:prstGeom prst="rect">
+            <a:avLst/>
+          </a:prstGeom>
+        </p:spPr>
+      </p:pic>
+      <p:sp>
+        <p:nvSpPr>
+          <p:cNvPr id="5" name="Footer Placeholder 4">
+            <a:extLst>
+              <a:ext uri="{FF2B5EF4-FFF2-40B4-BE49-F238E27FC236}">
+                <a16:creationId xmlns:a16="http://schemas.microsoft.com/office/drawing/2014/main" id="{5948E2FD-88DF-4770-A86A-797A344E6F16}"/>
+              </a:ext>
+            </a:extLst>
+          </p:cNvPr>
+          <p:cNvSpPr>
+            <a:spLocks noGrp="1"/>
+          </p:cNvSpPr>
+          <p:nvPr>
+            <p:ph type="ftr" sz="quarter" idx="11"/>
+          </p:nvPr>
+        </p:nvSpPr>
+        <p:spPr/>
+        <p:txBody>
+          <a:bodyPr/>
+          <a:lstStyle/>
+          <a:p>
+            <a:r>
+              <a:rPr lang="en-US" dirty="0"/>
+              <a:t>Image from https://www.r-project.org/ @ The R Foundation</a:t>
+            </a:r>
           </a:p>
         </p:txBody>
       </p:sp>
@@ -12120,7 +12194,7 @@
                   <a:srgbClr val="FFFFFF"/>
                 </a:solidFill>
               </a:rPr>
-              <a:t>How I’ve used it</a:t>
+              <a:t>How I’ve used R</a:t>
             </a:r>
           </a:p>
         </p:txBody>
@@ -12202,7 +12276,7 @@
           <a:p>
             <a:r>
               <a:rPr lang="en-US" sz="2600" dirty="0"/>
-              <a:t>Resourcing Dashboard</a:t>
+              <a:t>Resourcing Dashboards</a:t>
             </a:r>
           </a:p>
           <a:p>
@@ -12386,7 +12460,7 @@
                   <a:srgbClr val="FFFFFF"/>
                 </a:solidFill>
               </a:rPr>
-              <a:t>Installing R</a:t>
+              <a:t>Download Workshop Materials</a:t>
             </a:r>
           </a:p>
         </p:txBody>
@@ -12424,11 +12498,17 @@
               <a:t>Navigate to </a:t>
             </a:r>
             <a:r>
-              <a:rPr lang="en-US" u="sng" dirty="0">
+              <a:rPr lang="en-US" sz="2600" dirty="0">
                 <a:hlinkClick r:id="rId3"/>
               </a:rPr>
-              <a:t>https://cran.r-project.org/bin/windows/base/</a:t>
-            </a:r>
+              <a:t>https://github.com/pburnsdata/RWorkshop</a:t>
+            </a:r>
+            <a:endParaRPr lang="en-US" sz="2600" dirty="0"/>
+          </a:p>
+          <a:p>
+            <a:pPr marL="0" indent="0">
+              <a:buNone/>
+            </a:pPr>
             <a:endParaRPr lang="en-US" dirty="0"/>
           </a:p>
           <a:p>
@@ -12441,44 +12521,35 @@
           <p:cNvPr id="5" name="Picture 4">
             <a:extLst>
               <a:ext uri="{FF2B5EF4-FFF2-40B4-BE49-F238E27FC236}">
-                <a16:creationId xmlns:a16="http://schemas.microsoft.com/office/drawing/2014/main" id="{3DF7D430-D39E-452A-B214-30DD56DC811A}"/>
-              </a:ext>
-            </a:extLst>
-          </p:cNvPr>
-          <p:cNvPicPr/>
+                <a16:creationId xmlns:a16="http://schemas.microsoft.com/office/drawing/2014/main" id="{673AAA3B-D064-42B6-86BE-05585C8DE1E2}"/>
+              </a:ext>
+            </a:extLst>
+          </p:cNvPr>
+          <p:cNvPicPr>
+            <a:picLocks noChangeAspect="1"/>
+          </p:cNvPicPr>
           <p:nvPr/>
         </p:nvPicPr>
         <p:blipFill>
-          <a:blip r:embed="rId4" cstate="print">
-            <a:extLst>
-              <a:ext uri="{28A0092B-C50C-407E-A947-70E740481C1C}">
-                <a14:useLocalDpi xmlns:a14="http://schemas.microsoft.com/office/drawing/2010/main" val="0"/>
-              </a:ext>
-            </a:extLst>
-          </a:blip>
-          <a:srcRect/>
+          <a:blip r:embed="rId4"/>
           <a:stretch>
             <a:fillRect/>
           </a:stretch>
         </p:blipFill>
-        <p:spPr bwMode="auto">
+        <p:spPr>
           <a:xfrm>
-            <a:off x="838200" y="2915479"/>
-            <a:ext cx="10363199" cy="4041912"/>
+            <a:off x="2267467" y="2909894"/>
+            <a:ext cx="7657067" cy="4127904"/>
           </a:xfrm>
           <a:prstGeom prst="rect">
             <a:avLst/>
           </a:prstGeom>
-          <a:noFill/>
-          <a:ln>
-            <a:noFill/>
-          </a:ln>
         </p:spPr>
       </p:pic>
     </p:spTree>
     <p:extLst>
       <p:ext uri="{BB962C8B-B14F-4D97-AF65-F5344CB8AC3E}">
-        <p14:creationId xmlns:p14="http://schemas.microsoft.com/office/powerpoint/2010/main" val="912736439"/>
+        <p14:creationId xmlns:p14="http://schemas.microsoft.com/office/powerpoint/2010/main" val="3246863767"/>
       </p:ext>
     </p:extLst>
   </p:cSld>
@@ -12602,21 +12673,8 @@
                   <a:srgbClr val="FFFFFF"/>
                 </a:solidFill>
               </a:rPr>
-              <a:t>Installing </a:t>
-            </a:r>
-            <a:r>
-              <a:rPr lang="en-US" sz="4600" dirty="0" err="1">
-                <a:solidFill>
-                  <a:srgbClr val="FFFFFF"/>
-                </a:solidFill>
-              </a:rPr>
-              <a:t>Rstudio</a:t>
-            </a:r>
-            <a:endParaRPr lang="en-US" sz="4600" dirty="0">
-              <a:solidFill>
-                <a:srgbClr val="FFFFFF"/>
-              </a:solidFill>
-            </a:endParaRPr>
+              <a:t>Installing R</a:t>
+            </a:r>
           </a:p>
         </p:txBody>
       </p:sp>
@@ -12656,11 +12714,7 @@
               <a:rPr lang="en-US" u="sng" dirty="0">
                 <a:hlinkClick r:id="rId3"/>
               </a:rPr>
-              <a:t>https://www.rstudio.com/products/rstudio/download/#download</a:t>
-            </a:r>
-            <a:r>
-              <a:rPr lang="en-US" sz="2600" dirty="0"/>
-              <a:t> </a:t>
+              <a:t>https://cran.r-project.org/bin/windows/base/</a:t>
             </a:r>
             <a:endParaRPr lang="en-US" dirty="0"/>
           </a:p>
@@ -12671,38 +12725,47 @@
       </p:sp>
       <p:pic>
         <p:nvPicPr>
-          <p:cNvPr id="4" name="Picture 3">
-            <a:extLst>
-              <a:ext uri="{FF2B5EF4-FFF2-40B4-BE49-F238E27FC236}">
-                <a16:creationId xmlns:a16="http://schemas.microsoft.com/office/drawing/2014/main" id="{A13558EE-837F-45BA-879C-B105B788E5CF}"/>
-              </a:ext>
-            </a:extLst>
-          </p:cNvPr>
-          <p:cNvPicPr>
-            <a:picLocks noChangeAspect="1"/>
-          </p:cNvPicPr>
+          <p:cNvPr id="5" name="Picture 4">
+            <a:extLst>
+              <a:ext uri="{FF2B5EF4-FFF2-40B4-BE49-F238E27FC236}">
+                <a16:creationId xmlns:a16="http://schemas.microsoft.com/office/drawing/2014/main" id="{3DF7D430-D39E-452A-B214-30DD56DC811A}"/>
+              </a:ext>
+            </a:extLst>
+          </p:cNvPr>
+          <p:cNvPicPr/>
           <p:nvPr/>
         </p:nvPicPr>
         <p:blipFill>
-          <a:blip r:embed="rId4"/>
+          <a:blip r:embed="rId4" cstate="print">
+            <a:extLst>
+              <a:ext uri="{28A0092B-C50C-407E-A947-70E740481C1C}">
+                <a14:useLocalDpi xmlns:a14="http://schemas.microsoft.com/office/drawing/2010/main" val="0"/>
+              </a:ext>
+            </a:extLst>
+          </a:blip>
+          <a:srcRect/>
           <a:stretch>
             <a:fillRect/>
           </a:stretch>
         </p:blipFill>
-        <p:spPr>
+        <p:spPr bwMode="auto">
           <a:xfrm>
-            <a:off x="1553589" y="3429000"/>
-            <a:ext cx="9800211" cy="3823491"/>
+            <a:off x="838200" y="2915479"/>
+            <a:ext cx="10363199" cy="4041912"/>
           </a:xfrm>
           <a:prstGeom prst="rect">
             <a:avLst/>
           </a:prstGeom>
+          <a:noFill/>
+          <a:ln>
+            <a:noFill/>
+          </a:ln>
         </p:spPr>
       </p:pic>
     </p:spTree>
     <p:extLst>
       <p:ext uri="{BB962C8B-B14F-4D97-AF65-F5344CB8AC3E}">
-        <p14:creationId xmlns:p14="http://schemas.microsoft.com/office/powerpoint/2010/main" val="485545247"/>
+        <p14:creationId xmlns:p14="http://schemas.microsoft.com/office/powerpoint/2010/main" val="912736439"/>
       </p:ext>
     </p:extLst>
   </p:cSld>

</xml_diff>